<commit_message>
Latest and greatest for stages
</commit_message>
<xml_diff>
--- a/Stages/Indoor/Long Courses - 32 or less/24 Rounds v7.pptx
+++ b/Stages/Indoor/Long Courses - 32 or less/24 Rounds v7.pptx
@@ -242,7 +242,7 @@
             <a:fld id="{6FD315A2-9F92-4CCE-886A-5EF00EA90DC0}" type="datetimeFigureOut">
               <a:rPr lang="en-US" smtClean="0"/>
               <a:pPr/>
-              <a:t>11/21/22</a:t>
+              <a:t>11/25/22</a:t>
             </a:fld>
             <a:endParaRPr lang="en-US"/>
           </a:p>
@@ -3721,14 +3721,14 @@
           <p:nvPr>
             <p:extLst>
               <p:ext uri="{D42A27DB-BD31-4B8C-83A1-F6EECF244321}">
-                <p14:modId xmlns:p14="http://schemas.microsoft.com/office/powerpoint/2010/main" val="703232807"/>
+                <p14:modId xmlns:p14="http://schemas.microsoft.com/office/powerpoint/2010/main" val="2739673366"/>
               </p:ext>
             </p:extLst>
           </p:nvPr>
         </p:nvGraphicFramePr>
         <p:xfrm>
           <a:off x="177801" y="165099"/>
-          <a:ext cx="6997700" cy="2496505"/>
+          <a:ext cx="6997700" cy="2328865"/>
         </p:xfrm>
         <a:graphic>
           <a:graphicData uri="http://schemas.openxmlformats.org/drawingml/2006/table">
@@ -4051,7 +4051,7 @@
                           <a:latin typeface="Arial" charset="0"/>
                           <a:cs typeface="Times New Roman" charset="0"/>
                         </a:rPr>
-                        <a:t> Anywhere in shooting area facing directly downrange, hand gunner’s hands relaxed at sides. PCC, weak hand relaxed at side.</a:t>
+                        <a:t> Standing anywhere in the shooting area, facing downrange.  Handgun, wrists below belt.  PCC, buttstock on belt, weak hand wrist below the belt.</a:t>
                       </a:r>
                       <a:endParaRPr kumimoji="0" lang="en-US" sz="1200" b="0" i="0" u="none" strike="noStrike" cap="none" normalizeH="0" baseline="0" dirty="0">
                         <a:ln>
@@ -4198,7 +4198,7 @@
                           <a:latin typeface="Arial" charset="0"/>
                           <a:cs typeface="Times New Roman" charset="0"/>
                         </a:rPr>
-                        <a:t>Handgun loaded and holstered, PCC loaded with buttstock on belt facing down range</a:t>
+                        <a:t>Handgun loaded and holstered. PCC loaded with safety on, buttstock on belt.</a:t>
                       </a:r>
                       <a:endParaRPr kumimoji="0" lang="en-US" sz="1100" b="1" i="0" u="none" strike="noStrike" cap="none" normalizeH="0" baseline="0" dirty="0">
                         <a:ln>
@@ -4318,7 +4318,7 @@
                           <a:latin typeface="Arial" charset="0"/>
                           <a:cs typeface="Times New Roman" charset="0"/>
                         </a:rPr>
-                        <a:t>Comstock, 24 rounds, 000 points</a:t>
+                        <a:t>Comstock, 24 rounds, 120 points</a:t>
                       </a:r>
                     </a:p>
                     <a:p>
@@ -4365,7 +4365,35 @@
                           <a:latin typeface="Arial" charset="0"/>
                           <a:cs typeface="Times New Roman" charset="0"/>
                         </a:rPr>
-                        <a:t>	   14 USPSA</a:t>
+                        <a:t>	</a:t>
+                      </a:r>
+                      <a:r>
+                        <a:rPr kumimoji="0" lang="en-US" sz="1100" b="0" i="0" u="none" strike="noStrike" cap="none" normalizeH="0" baseline="0">
+                          <a:ln>
+                            <a:noFill/>
+                          </a:ln>
+                          <a:solidFill>
+                            <a:schemeClr val="tx1"/>
+                          </a:solidFill>
+                          <a:effectLst/>
+                          <a:latin typeface="Arial" charset="0"/>
+                          <a:cs typeface="Times New Roman" charset="0"/>
+                        </a:rPr>
+                        <a:t>   12 </a:t>
+                      </a:r>
+                      <a:r>
+                        <a:rPr kumimoji="0" lang="en-US" sz="1100" b="0" i="0" u="none" strike="noStrike" cap="none" normalizeH="0" baseline="0" dirty="0">
+                          <a:ln>
+                            <a:noFill/>
+                          </a:ln>
+                          <a:solidFill>
+                            <a:schemeClr val="tx1"/>
+                          </a:solidFill>
+                          <a:effectLst/>
+                          <a:latin typeface="Arial" charset="0"/>
+                          <a:cs typeface="Times New Roman" charset="0"/>
+                        </a:rPr>
+                        <a:t>USPSA</a:t>
                       </a:r>
                     </a:p>
                     <a:p>
@@ -4775,333 +4803,6 @@
           </a:ln>
         </p:spPr>
       </p:pic>
-      <p:grpSp>
-        <p:nvGrpSpPr>
-          <p:cNvPr id="2" name="Group 1">
-            <a:extLst>
-              <a:ext uri="{FF2B5EF4-FFF2-40B4-BE49-F238E27FC236}">
-                <a16:creationId xmlns:a16="http://schemas.microsoft.com/office/drawing/2014/main" id="{511F7CE2-5AF9-A670-7CBE-E52D55C84D73}"/>
-              </a:ext>
-            </a:extLst>
-          </p:cNvPr>
-          <p:cNvGrpSpPr/>
-          <p:nvPr/>
-        </p:nvGrpSpPr>
-        <p:grpSpPr>
-          <a:xfrm>
-            <a:off x="3506124" y="4034658"/>
-            <a:ext cx="325438" cy="1233488"/>
-            <a:chOff x="838200" y="239263"/>
-            <a:chExt cx="325438" cy="1233488"/>
-          </a:xfrm>
-        </p:grpSpPr>
-        <p:sp>
-          <p:nvSpPr>
-            <p:cNvPr id="3" name="AutoShape 673">
-              <a:extLst>
-                <a:ext uri="{FF2B5EF4-FFF2-40B4-BE49-F238E27FC236}">
-                  <a16:creationId xmlns:a16="http://schemas.microsoft.com/office/drawing/2014/main" id="{2D328B5D-5BD6-6B58-7ACC-85AB6769C627}"/>
-                </a:ext>
-              </a:extLst>
-            </p:cNvPr>
-            <p:cNvSpPr>
-              <a:spLocks noChangeArrowheads="1"/>
-            </p:cNvSpPr>
-            <p:nvPr/>
-          </p:nvSpPr>
-          <p:spPr bwMode="auto">
-            <a:xfrm>
-              <a:off x="838200" y="752026"/>
-              <a:ext cx="325438" cy="720725"/>
-            </a:xfrm>
-            <a:prstGeom prst="can">
-              <a:avLst>
-                <a:gd name="adj" fmla="val 55366"/>
-              </a:avLst>
-            </a:prstGeom>
-            <a:solidFill>
-              <a:srgbClr val="00CCFF"/>
-            </a:solidFill>
-            <a:ln w="9525">
-              <a:solidFill>
-                <a:schemeClr val="tx1"/>
-              </a:solidFill>
-              <a:round/>
-              <a:headEnd/>
-              <a:tailEnd/>
-            </a:ln>
-          </p:spPr>
-          <p:txBody>
-            <a:bodyPr wrap="none" anchor="ctr"/>
-            <a:lstStyle/>
-            <a:p>
-              <a:endParaRPr lang="en-US"/>
-            </a:p>
-          </p:txBody>
-        </p:sp>
-        <p:sp>
-          <p:nvSpPr>
-            <p:cNvPr id="4" name="AutoShape 673">
-              <a:extLst>
-                <a:ext uri="{FF2B5EF4-FFF2-40B4-BE49-F238E27FC236}">
-                  <a16:creationId xmlns:a16="http://schemas.microsoft.com/office/drawing/2014/main" id="{2D102E18-058B-09FC-F9A8-59F52374B489}"/>
-                </a:ext>
-              </a:extLst>
-            </p:cNvPr>
-            <p:cNvSpPr>
-              <a:spLocks noChangeArrowheads="1"/>
-            </p:cNvSpPr>
-            <p:nvPr/>
-          </p:nvSpPr>
-          <p:spPr bwMode="auto">
-            <a:xfrm>
-              <a:off x="838200" y="239263"/>
-              <a:ext cx="325438" cy="720725"/>
-            </a:xfrm>
-            <a:prstGeom prst="can">
-              <a:avLst>
-                <a:gd name="adj" fmla="val 55366"/>
-              </a:avLst>
-            </a:prstGeom>
-            <a:solidFill>
-              <a:srgbClr val="00CCFF"/>
-            </a:solidFill>
-            <a:ln w="9525">
-              <a:solidFill>
-                <a:schemeClr val="tx1"/>
-              </a:solidFill>
-              <a:round/>
-              <a:headEnd/>
-              <a:tailEnd/>
-            </a:ln>
-          </p:spPr>
-          <p:txBody>
-            <a:bodyPr wrap="none" anchor="ctr"/>
-            <a:lstStyle/>
-            <a:p>
-              <a:endParaRPr lang="en-US"/>
-            </a:p>
-          </p:txBody>
-        </p:sp>
-      </p:grpSp>
-      <p:grpSp>
-        <p:nvGrpSpPr>
-          <p:cNvPr id="8" name="Group 7">
-            <a:extLst>
-              <a:ext uri="{FF2B5EF4-FFF2-40B4-BE49-F238E27FC236}">
-                <a16:creationId xmlns:a16="http://schemas.microsoft.com/office/drawing/2014/main" id="{F8FB5AC5-7BBD-0F49-DE5C-3933AA0FE070}"/>
-              </a:ext>
-            </a:extLst>
-          </p:cNvPr>
-          <p:cNvGrpSpPr/>
-          <p:nvPr/>
-        </p:nvGrpSpPr>
-        <p:grpSpPr>
-          <a:xfrm>
-            <a:off x="4659443" y="4024312"/>
-            <a:ext cx="325438" cy="1233488"/>
-            <a:chOff x="838200" y="239263"/>
-            <a:chExt cx="325438" cy="1233488"/>
-          </a:xfrm>
-        </p:grpSpPr>
-        <p:sp>
-          <p:nvSpPr>
-            <p:cNvPr id="9" name="AutoShape 673">
-              <a:extLst>
-                <a:ext uri="{FF2B5EF4-FFF2-40B4-BE49-F238E27FC236}">
-                  <a16:creationId xmlns:a16="http://schemas.microsoft.com/office/drawing/2014/main" id="{E44CE448-0B9C-7B65-890F-914EB75851D9}"/>
-                </a:ext>
-              </a:extLst>
-            </p:cNvPr>
-            <p:cNvSpPr>
-              <a:spLocks noChangeArrowheads="1"/>
-            </p:cNvSpPr>
-            <p:nvPr/>
-          </p:nvSpPr>
-          <p:spPr bwMode="auto">
-            <a:xfrm>
-              <a:off x="838200" y="752026"/>
-              <a:ext cx="325438" cy="720725"/>
-            </a:xfrm>
-            <a:prstGeom prst="can">
-              <a:avLst>
-                <a:gd name="adj" fmla="val 55366"/>
-              </a:avLst>
-            </a:prstGeom>
-            <a:solidFill>
-              <a:srgbClr val="00CCFF"/>
-            </a:solidFill>
-            <a:ln w="9525">
-              <a:solidFill>
-                <a:schemeClr val="tx1"/>
-              </a:solidFill>
-              <a:round/>
-              <a:headEnd/>
-              <a:tailEnd/>
-            </a:ln>
-          </p:spPr>
-          <p:txBody>
-            <a:bodyPr wrap="none" anchor="ctr"/>
-            <a:lstStyle/>
-            <a:p>
-              <a:endParaRPr lang="en-US"/>
-            </a:p>
-          </p:txBody>
-        </p:sp>
-        <p:sp>
-          <p:nvSpPr>
-            <p:cNvPr id="10" name="AutoShape 673">
-              <a:extLst>
-                <a:ext uri="{FF2B5EF4-FFF2-40B4-BE49-F238E27FC236}">
-                  <a16:creationId xmlns:a16="http://schemas.microsoft.com/office/drawing/2014/main" id="{3BD342C4-0197-C8B2-BEF7-9CAF3420FB53}"/>
-                </a:ext>
-              </a:extLst>
-            </p:cNvPr>
-            <p:cNvSpPr>
-              <a:spLocks noChangeArrowheads="1"/>
-            </p:cNvSpPr>
-            <p:nvPr/>
-          </p:nvSpPr>
-          <p:spPr bwMode="auto">
-            <a:xfrm>
-              <a:off x="838200" y="239263"/>
-              <a:ext cx="325438" cy="720725"/>
-            </a:xfrm>
-            <a:prstGeom prst="can">
-              <a:avLst>
-                <a:gd name="adj" fmla="val 55366"/>
-              </a:avLst>
-            </a:prstGeom>
-            <a:solidFill>
-              <a:srgbClr val="00CCFF"/>
-            </a:solidFill>
-            <a:ln w="9525">
-              <a:solidFill>
-                <a:schemeClr val="tx1"/>
-              </a:solidFill>
-              <a:round/>
-              <a:headEnd/>
-              <a:tailEnd/>
-            </a:ln>
-          </p:spPr>
-          <p:txBody>
-            <a:bodyPr wrap="none" anchor="ctr"/>
-            <a:lstStyle/>
-            <a:p>
-              <a:endParaRPr lang="en-US"/>
-            </a:p>
-          </p:txBody>
-        </p:sp>
-      </p:grpSp>
-      <p:grpSp>
-        <p:nvGrpSpPr>
-          <p:cNvPr id="17" name="Group 16">
-            <a:extLst>
-              <a:ext uri="{FF2B5EF4-FFF2-40B4-BE49-F238E27FC236}">
-                <a16:creationId xmlns:a16="http://schemas.microsoft.com/office/drawing/2014/main" id="{583FDC31-44DA-41CB-3516-603DA74971BC}"/>
-              </a:ext>
-            </a:extLst>
-          </p:cNvPr>
-          <p:cNvGrpSpPr/>
-          <p:nvPr/>
-        </p:nvGrpSpPr>
-        <p:grpSpPr>
-          <a:xfrm>
-            <a:off x="2352805" y="4034658"/>
-            <a:ext cx="325438" cy="1233488"/>
-            <a:chOff x="838200" y="239263"/>
-            <a:chExt cx="325438" cy="1233488"/>
-          </a:xfrm>
-        </p:grpSpPr>
-        <p:sp>
-          <p:nvSpPr>
-            <p:cNvPr id="18" name="AutoShape 673">
-              <a:extLst>
-                <a:ext uri="{FF2B5EF4-FFF2-40B4-BE49-F238E27FC236}">
-                  <a16:creationId xmlns:a16="http://schemas.microsoft.com/office/drawing/2014/main" id="{B71C0390-4E1B-FEE2-13C4-295600A4F4AB}"/>
-                </a:ext>
-              </a:extLst>
-            </p:cNvPr>
-            <p:cNvSpPr>
-              <a:spLocks noChangeArrowheads="1"/>
-            </p:cNvSpPr>
-            <p:nvPr/>
-          </p:nvSpPr>
-          <p:spPr bwMode="auto">
-            <a:xfrm>
-              <a:off x="838200" y="752026"/>
-              <a:ext cx="325438" cy="720725"/>
-            </a:xfrm>
-            <a:prstGeom prst="can">
-              <a:avLst>
-                <a:gd name="adj" fmla="val 55366"/>
-              </a:avLst>
-            </a:prstGeom>
-            <a:solidFill>
-              <a:srgbClr val="00CCFF"/>
-            </a:solidFill>
-            <a:ln w="9525">
-              <a:solidFill>
-                <a:schemeClr val="tx1"/>
-              </a:solidFill>
-              <a:round/>
-              <a:headEnd/>
-              <a:tailEnd/>
-            </a:ln>
-          </p:spPr>
-          <p:txBody>
-            <a:bodyPr wrap="none" anchor="ctr"/>
-            <a:lstStyle/>
-            <a:p>
-              <a:endParaRPr lang="en-US"/>
-            </a:p>
-          </p:txBody>
-        </p:sp>
-        <p:sp>
-          <p:nvSpPr>
-            <p:cNvPr id="19" name="AutoShape 673">
-              <a:extLst>
-                <a:ext uri="{FF2B5EF4-FFF2-40B4-BE49-F238E27FC236}">
-                  <a16:creationId xmlns:a16="http://schemas.microsoft.com/office/drawing/2014/main" id="{E385D289-86D6-D242-9A17-51EE62DB5CDD}"/>
-                </a:ext>
-              </a:extLst>
-            </p:cNvPr>
-            <p:cNvSpPr>
-              <a:spLocks noChangeArrowheads="1"/>
-            </p:cNvSpPr>
-            <p:nvPr/>
-          </p:nvSpPr>
-          <p:spPr bwMode="auto">
-            <a:xfrm>
-              <a:off x="838200" y="239263"/>
-              <a:ext cx="325438" cy="720725"/>
-            </a:xfrm>
-            <a:prstGeom prst="can">
-              <a:avLst>
-                <a:gd name="adj" fmla="val 55366"/>
-              </a:avLst>
-            </a:prstGeom>
-            <a:solidFill>
-              <a:srgbClr val="00CCFF"/>
-            </a:solidFill>
-            <a:ln w="9525">
-              <a:solidFill>
-                <a:schemeClr val="tx1"/>
-              </a:solidFill>
-              <a:round/>
-              <a:headEnd/>
-              <a:tailEnd/>
-            </a:ln>
-          </p:spPr>
-          <p:txBody>
-            <a:bodyPr wrap="none" anchor="ctr"/>
-            <a:lstStyle/>
-            <a:p>
-              <a:endParaRPr lang="en-US"/>
-            </a:p>
-          </p:txBody>
-        </p:sp>
-      </p:grpSp>
       <p:grpSp>
         <p:nvGrpSpPr>
           <p:cNvPr id="20" name="Group 107">

</xml_diff>